<commit_message>
benchmarks y objetivos en documento de preguntas
</commit_message>
<xml_diff>
--- a/anexos/Datos-analisisdelacompetencia-otros.pptx
+++ b/anexos/Datos-analisisdelacompetencia-otros.pptx
@@ -12,6 +12,10 @@
     <p:sldId id="259" r:id="rId6"/>
     <p:sldId id="261" r:id="rId7"/>
     <p:sldId id="262" r:id="rId8"/>
+    <p:sldId id="263" r:id="rId9"/>
+    <p:sldId id="264" r:id="rId10"/>
+    <p:sldId id="265" r:id="rId11"/>
+    <p:sldId id="266" r:id="rId12"/>
   </p:sldIdLst>
   <p:sldSz cx="12192000" cy="6858000"/>
   <p:notesSz cx="6858000" cy="9144000"/>
@@ -844,7 +848,7 @@
           <a:p>
             <a:fld id="{5FE37131-484A-4364-A261-5A22E7127797}" type="datetimeFigureOut">
               <a:rPr lang="es-CL" smtClean="0"/>
-              <a:t>02-07-2018</a:t>
+              <a:t>05-07-2018</a:t>
             </a:fld>
             <a:endParaRPr lang="es-CL"/>
           </a:p>
@@ -1095,7 +1099,7 @@
           <a:p>
             <a:fld id="{5FE37131-484A-4364-A261-5A22E7127797}" type="datetimeFigureOut">
               <a:rPr lang="es-CL" smtClean="0"/>
-              <a:t>02-07-2018</a:t>
+              <a:t>05-07-2018</a:t>
             </a:fld>
             <a:endParaRPr lang="es-CL"/>
           </a:p>
@@ -1409,7 +1413,7 @@
           <a:p>
             <a:fld id="{5FE37131-484A-4364-A261-5A22E7127797}" type="datetimeFigureOut">
               <a:rPr lang="es-CL" smtClean="0"/>
-              <a:t>02-07-2018</a:t>
+              <a:t>05-07-2018</a:t>
             </a:fld>
             <a:endParaRPr lang="es-CL"/>
           </a:p>
@@ -1750,7 +1754,7 @@
           <a:p>
             <a:fld id="{5FE37131-484A-4364-A261-5A22E7127797}" type="datetimeFigureOut">
               <a:rPr lang="es-CL" smtClean="0"/>
-              <a:t>02-07-2018</a:t>
+              <a:t>05-07-2018</a:t>
             </a:fld>
             <a:endParaRPr lang="es-CL"/>
           </a:p>
@@ -2064,7 +2068,7 @@
           <a:p>
             <a:fld id="{5FE37131-484A-4364-A261-5A22E7127797}" type="datetimeFigureOut">
               <a:rPr lang="es-CL" smtClean="0"/>
-              <a:t>02-07-2018</a:t>
+              <a:t>05-07-2018</a:t>
             </a:fld>
             <a:endParaRPr lang="es-CL"/>
           </a:p>
@@ -2457,7 +2461,7 @@
           <a:p>
             <a:fld id="{5FE37131-484A-4364-A261-5A22E7127797}" type="datetimeFigureOut">
               <a:rPr lang="es-CL" smtClean="0"/>
-              <a:t>02-07-2018</a:t>
+              <a:t>05-07-2018</a:t>
             </a:fld>
             <a:endParaRPr lang="es-CL"/>
           </a:p>
@@ -2627,7 +2631,7 @@
           <a:p>
             <a:fld id="{5FE37131-484A-4364-A261-5A22E7127797}" type="datetimeFigureOut">
               <a:rPr lang="es-CL" smtClean="0"/>
-              <a:t>02-07-2018</a:t>
+              <a:t>05-07-2018</a:t>
             </a:fld>
             <a:endParaRPr lang="es-CL"/>
           </a:p>
@@ -2807,7 +2811,7 @@
           <a:p>
             <a:fld id="{5FE37131-484A-4364-A261-5A22E7127797}" type="datetimeFigureOut">
               <a:rPr lang="es-CL" smtClean="0"/>
-              <a:t>02-07-2018</a:t>
+              <a:t>05-07-2018</a:t>
             </a:fld>
             <a:endParaRPr lang="es-CL"/>
           </a:p>
@@ -2983,7 +2987,7 @@
           <a:p>
             <a:fld id="{5FE37131-484A-4364-A261-5A22E7127797}" type="datetimeFigureOut">
               <a:rPr lang="es-CL" smtClean="0"/>
-              <a:t>02-07-2018</a:t>
+              <a:t>05-07-2018</a:t>
             </a:fld>
             <a:endParaRPr lang="es-CL"/>
           </a:p>
@@ -3230,7 +3234,7 @@
           <a:p>
             <a:fld id="{5FE37131-484A-4364-A261-5A22E7127797}" type="datetimeFigureOut">
               <a:rPr lang="es-CL" smtClean="0"/>
-              <a:t>02-07-2018</a:t>
+              <a:t>05-07-2018</a:t>
             </a:fld>
             <a:endParaRPr lang="es-CL"/>
           </a:p>
@@ -3462,7 +3466,7 @@
           <a:p>
             <a:fld id="{5FE37131-484A-4364-A261-5A22E7127797}" type="datetimeFigureOut">
               <a:rPr lang="es-CL" smtClean="0"/>
-              <a:t>02-07-2018</a:t>
+              <a:t>05-07-2018</a:t>
             </a:fld>
             <a:endParaRPr lang="es-CL"/>
           </a:p>
@@ -3836,7 +3840,7 @@
           <a:p>
             <a:fld id="{5FE37131-484A-4364-A261-5A22E7127797}" type="datetimeFigureOut">
               <a:rPr lang="es-CL" smtClean="0"/>
-              <a:t>02-07-2018</a:t>
+              <a:t>05-07-2018</a:t>
             </a:fld>
             <a:endParaRPr lang="es-CL"/>
           </a:p>
@@ -3959,7 +3963,7 @@
           <a:p>
             <a:fld id="{5FE37131-484A-4364-A261-5A22E7127797}" type="datetimeFigureOut">
               <a:rPr lang="es-CL" smtClean="0"/>
-              <a:t>02-07-2018</a:t>
+              <a:t>05-07-2018</a:t>
             </a:fld>
             <a:endParaRPr lang="es-CL"/>
           </a:p>
@@ -4054,7 +4058,7 @@
           <a:p>
             <a:fld id="{5FE37131-484A-4364-A261-5A22E7127797}" type="datetimeFigureOut">
               <a:rPr lang="es-CL" smtClean="0"/>
-              <a:t>02-07-2018</a:t>
+              <a:t>05-07-2018</a:t>
             </a:fld>
             <a:endParaRPr lang="es-CL"/>
           </a:p>
@@ -4309,7 +4313,7 @@
           <a:p>
             <a:fld id="{5FE37131-484A-4364-A261-5A22E7127797}" type="datetimeFigureOut">
               <a:rPr lang="es-CL" smtClean="0"/>
-              <a:t>02-07-2018</a:t>
+              <a:t>05-07-2018</a:t>
             </a:fld>
             <a:endParaRPr lang="es-CL"/>
           </a:p>
@@ -4572,7 +4576,7 @@
           <a:p>
             <a:fld id="{5FE37131-484A-4364-A261-5A22E7127797}" type="datetimeFigureOut">
               <a:rPr lang="es-CL" smtClean="0"/>
-              <a:t>02-07-2018</a:t>
+              <a:t>05-07-2018</a:t>
             </a:fld>
             <a:endParaRPr lang="es-CL"/>
           </a:p>
@@ -5315,7 +5319,7 @@
           <a:p>
             <a:fld id="{5FE37131-484A-4364-A261-5A22E7127797}" type="datetimeFigureOut">
               <a:rPr lang="es-CL" smtClean="0"/>
-              <a:t>02-07-2018</a:t>
+              <a:t>05-07-2018</a:t>
             </a:fld>
             <a:endParaRPr lang="es-CL"/>
           </a:p>
@@ -5908,6 +5912,1302 @@
 </p:sld>
 </file>
 
+<file path=ppt/slides/slide10.xml><?xml version="1.0" encoding="utf-8"?>
+<p:sld xmlns:a="http://schemas.openxmlformats.org/drawingml/2006/main" xmlns:r="http://schemas.openxmlformats.org/officeDocument/2006/relationships" xmlns:p="http://schemas.openxmlformats.org/presentationml/2006/main">
+  <p:cSld>
+    <p:spTree>
+      <p:nvGrpSpPr>
+        <p:cNvPr id="1" name=""/>
+        <p:cNvGrpSpPr/>
+        <p:nvPr/>
+      </p:nvGrpSpPr>
+      <p:grpSpPr>
+        <a:xfrm>
+          <a:off x="0" y="0"/>
+          <a:ext cx="0" cy="0"/>
+          <a:chOff x="0" y="0"/>
+          <a:chExt cx="0" cy="0"/>
+        </a:xfrm>
+      </p:grpSpPr>
+      <p:sp>
+        <p:nvSpPr>
+          <p:cNvPr id="2" name="Título 1">
+            <a:extLst>
+              <a:ext uri="{FF2B5EF4-FFF2-40B4-BE49-F238E27FC236}">
+                <a16:creationId xmlns:a16="http://schemas.microsoft.com/office/drawing/2014/main" id="{FF0354DC-A145-4D8A-B438-FA1AD2ED5AFC}"/>
+              </a:ext>
+            </a:extLst>
+          </p:cNvPr>
+          <p:cNvSpPr>
+            <a:spLocks noGrp="1"/>
+          </p:cNvSpPr>
+          <p:nvPr>
+            <p:ph type="title"/>
+          </p:nvPr>
+        </p:nvSpPr>
+        <p:spPr/>
+        <p:txBody>
+          <a:bodyPr/>
+          <a:lstStyle/>
+          <a:p>
+            <a:r>
+              <a:rPr lang="es-CL" dirty="0"/>
+              <a:t>Comparación en redes sociales </a:t>
+            </a:r>
+          </a:p>
+        </p:txBody>
+      </p:sp>
+      <p:sp>
+        <p:nvSpPr>
+          <p:cNvPr id="3" name="Marcador de contenido 2">
+            <a:extLst>
+              <a:ext uri="{FF2B5EF4-FFF2-40B4-BE49-F238E27FC236}">
+                <a16:creationId xmlns:a16="http://schemas.microsoft.com/office/drawing/2014/main" id="{5CCB6212-743F-4C59-99AC-860CB6E14739}"/>
+              </a:ext>
+            </a:extLst>
+          </p:cNvPr>
+          <p:cNvSpPr>
+            <a:spLocks noGrp="1"/>
+          </p:cNvSpPr>
+          <p:nvPr>
+            <p:ph idx="1"/>
+          </p:nvPr>
+        </p:nvSpPr>
+        <p:spPr>
+          <a:xfrm>
+            <a:off x="677332" y="1467203"/>
+            <a:ext cx="11223723" cy="463197"/>
+          </a:xfrm>
+        </p:spPr>
+        <p:txBody>
+          <a:bodyPr>
+            <a:normAutofit/>
+          </a:bodyPr>
+          <a:lstStyle/>
+          <a:p>
+            <a:r>
+              <a:rPr lang="es-CL" dirty="0"/>
+              <a:t>Facebook: Celiacos Santiago - 5187 integrantes</a:t>
+            </a:r>
+          </a:p>
+          <a:p>
+            <a:pPr marL="0" indent="0">
+              <a:buNone/>
+            </a:pPr>
+            <a:endParaRPr lang="es-CL" dirty="0"/>
+          </a:p>
+        </p:txBody>
+      </p:sp>
+      <p:pic>
+        <p:nvPicPr>
+          <p:cNvPr id="4" name="Imagen 3">
+            <a:extLst>
+              <a:ext uri="{FF2B5EF4-FFF2-40B4-BE49-F238E27FC236}">
+                <a16:creationId xmlns:a16="http://schemas.microsoft.com/office/drawing/2014/main" id="{41524867-BC24-4185-AA4D-543485938E21}"/>
+              </a:ext>
+            </a:extLst>
+          </p:cNvPr>
+          <p:cNvPicPr>
+            <a:picLocks noChangeAspect="1"/>
+          </p:cNvPicPr>
+          <p:nvPr/>
+        </p:nvPicPr>
+        <p:blipFill rotWithShape="1">
+          <a:blip r:embed="rId2"/>
+          <a:srcRect t="2962" r="6627" b="2962"/>
+          <a:stretch/>
+        </p:blipFill>
+        <p:spPr>
+          <a:xfrm>
+            <a:off x="2488853" y="1930400"/>
+            <a:ext cx="7150486" cy="4571135"/>
+          </a:xfrm>
+          <a:prstGeom prst="rect">
+            <a:avLst/>
+          </a:prstGeom>
+        </p:spPr>
+      </p:pic>
+    </p:spTree>
+    <p:extLst>
+      <p:ext uri="{BB962C8B-B14F-4D97-AF65-F5344CB8AC3E}">
+        <p14:creationId xmlns:p14="http://schemas.microsoft.com/office/powerpoint/2010/main" val="10940838"/>
+      </p:ext>
+    </p:extLst>
+  </p:cSld>
+  <p:clrMapOvr>
+    <a:masterClrMapping/>
+  </p:clrMapOvr>
+</p:sld>
+</file>
+
+<file path=ppt/slides/slide11.xml><?xml version="1.0" encoding="utf-8"?>
+<p:sld xmlns:a="http://schemas.openxmlformats.org/drawingml/2006/main" xmlns:r="http://schemas.openxmlformats.org/officeDocument/2006/relationships" xmlns:p="http://schemas.openxmlformats.org/presentationml/2006/main">
+  <p:cSld>
+    <p:spTree>
+      <p:nvGrpSpPr>
+        <p:cNvPr id="1" name=""/>
+        <p:cNvGrpSpPr/>
+        <p:nvPr/>
+      </p:nvGrpSpPr>
+      <p:grpSpPr>
+        <a:xfrm>
+          <a:off x="0" y="0"/>
+          <a:ext cx="0" cy="0"/>
+          <a:chOff x="0" y="0"/>
+          <a:chExt cx="0" cy="0"/>
+        </a:xfrm>
+      </p:grpSpPr>
+      <p:sp>
+        <p:nvSpPr>
+          <p:cNvPr id="2" name="Título 1">
+            <a:extLst>
+              <a:ext uri="{FF2B5EF4-FFF2-40B4-BE49-F238E27FC236}">
+                <a16:creationId xmlns:a16="http://schemas.microsoft.com/office/drawing/2014/main" id="{A1A778C5-E757-4ED7-9388-0118B6A4F73A}"/>
+              </a:ext>
+            </a:extLst>
+          </p:cNvPr>
+          <p:cNvSpPr>
+            <a:spLocks noGrp="1"/>
+          </p:cNvSpPr>
+          <p:nvPr>
+            <p:ph type="title"/>
+          </p:nvPr>
+        </p:nvSpPr>
+        <p:spPr>
+          <a:xfrm>
+            <a:off x="594207" y="263236"/>
+            <a:ext cx="8596668" cy="1320800"/>
+          </a:xfrm>
+        </p:spPr>
+        <p:txBody>
+          <a:bodyPr/>
+          <a:lstStyle/>
+          <a:p>
+            <a:r>
+              <a:rPr lang="es-CL" dirty="0"/>
+              <a:t>Comparaciones de páginas de Facebook</a:t>
+            </a:r>
+          </a:p>
+        </p:txBody>
+      </p:sp>
+      <p:graphicFrame>
+        <p:nvGraphicFramePr>
+          <p:cNvPr id="5" name="Marcador de contenido 8">
+            <a:extLst>
+              <a:ext uri="{FF2B5EF4-FFF2-40B4-BE49-F238E27FC236}">
+                <a16:creationId xmlns:a16="http://schemas.microsoft.com/office/drawing/2014/main" id="{90304CE9-63F6-47A9-9688-493C77FC161F}"/>
+              </a:ext>
+            </a:extLst>
+          </p:cNvPr>
+          <p:cNvGraphicFramePr>
+            <a:graphicFrameLocks noGrp="1"/>
+          </p:cNvGraphicFramePr>
+          <p:nvPr>
+            <p:ph idx="1"/>
+            <p:extLst>
+              <p:ext uri="{D42A27DB-BD31-4B8C-83A1-F6EECF244321}">
+                <p14:modId xmlns:p14="http://schemas.microsoft.com/office/powerpoint/2010/main" val="4230944500"/>
+              </p:ext>
+            </p:extLst>
+          </p:nvPr>
+        </p:nvGraphicFramePr>
+        <p:xfrm>
+          <a:off x="152399" y="2152871"/>
+          <a:ext cx="12025745" cy="3413935"/>
+        </p:xfrm>
+        <a:graphic>
+          <a:graphicData uri="http://schemas.openxmlformats.org/drawingml/2006/table">
+            <a:tbl>
+              <a:tblPr firstRow="1" bandRow="1">
+                <a:tableStyleId>{5C22544A-7EE6-4342-B048-85BDC9FD1C3A}</a:tableStyleId>
+              </a:tblPr>
+              <a:tblGrid>
+                <a:gridCol w="1673568">
+                  <a:extLst>
+                    <a:ext uri="{9D8B030D-6E8A-4147-A177-3AD203B41FA5}">
+                      <a16:colId xmlns:a16="http://schemas.microsoft.com/office/drawing/2014/main" val="4035857904"/>
+                    </a:ext>
+                  </a:extLst>
+                </a:gridCol>
+                <a:gridCol w="557015">
+                  <a:extLst>
+                    <a:ext uri="{9D8B030D-6E8A-4147-A177-3AD203B41FA5}">
+                      <a16:colId xmlns:a16="http://schemas.microsoft.com/office/drawing/2014/main" val="1729938434"/>
+                    </a:ext>
+                  </a:extLst>
+                </a:gridCol>
+                <a:gridCol w="997527">
+                  <a:extLst>
+                    <a:ext uri="{9D8B030D-6E8A-4147-A177-3AD203B41FA5}">
+                      <a16:colId xmlns:a16="http://schemas.microsoft.com/office/drawing/2014/main" val="548451439"/>
+                    </a:ext>
+                  </a:extLst>
+                </a:gridCol>
+                <a:gridCol w="720436">
+                  <a:extLst>
+                    <a:ext uri="{9D8B030D-6E8A-4147-A177-3AD203B41FA5}">
+                      <a16:colId xmlns:a16="http://schemas.microsoft.com/office/drawing/2014/main" val="3659515249"/>
+                    </a:ext>
+                  </a:extLst>
+                </a:gridCol>
+                <a:gridCol w="789710">
+                  <a:extLst>
+                    <a:ext uri="{9D8B030D-6E8A-4147-A177-3AD203B41FA5}">
+                      <a16:colId xmlns:a16="http://schemas.microsoft.com/office/drawing/2014/main" val="1207632512"/>
+                    </a:ext>
+                  </a:extLst>
+                </a:gridCol>
+                <a:gridCol w="845127">
+                  <a:extLst>
+                    <a:ext uri="{9D8B030D-6E8A-4147-A177-3AD203B41FA5}">
+                      <a16:colId xmlns:a16="http://schemas.microsoft.com/office/drawing/2014/main" val="1729795642"/>
+                    </a:ext>
+                  </a:extLst>
+                </a:gridCol>
+                <a:gridCol w="1177636">
+                  <a:extLst>
+                    <a:ext uri="{9D8B030D-6E8A-4147-A177-3AD203B41FA5}">
+                      <a16:colId xmlns:a16="http://schemas.microsoft.com/office/drawing/2014/main" val="825913982"/>
+                    </a:ext>
+                  </a:extLst>
+                </a:gridCol>
+                <a:gridCol w="886691">
+                  <a:extLst>
+                    <a:ext uri="{9D8B030D-6E8A-4147-A177-3AD203B41FA5}">
+                      <a16:colId xmlns:a16="http://schemas.microsoft.com/office/drawing/2014/main" val="3168731185"/>
+                    </a:ext>
+                  </a:extLst>
+                </a:gridCol>
+                <a:gridCol w="1288473">
+                  <a:extLst>
+                    <a:ext uri="{9D8B030D-6E8A-4147-A177-3AD203B41FA5}">
+                      <a16:colId xmlns:a16="http://schemas.microsoft.com/office/drawing/2014/main" val="1833359010"/>
+                    </a:ext>
+                  </a:extLst>
+                </a:gridCol>
+                <a:gridCol w="665018">
+                  <a:extLst>
+                    <a:ext uri="{9D8B030D-6E8A-4147-A177-3AD203B41FA5}">
+                      <a16:colId xmlns:a16="http://schemas.microsoft.com/office/drawing/2014/main" val="3874488616"/>
+                    </a:ext>
+                  </a:extLst>
+                </a:gridCol>
+                <a:gridCol w="1440873">
+                  <a:extLst>
+                    <a:ext uri="{9D8B030D-6E8A-4147-A177-3AD203B41FA5}">
+                      <a16:colId xmlns:a16="http://schemas.microsoft.com/office/drawing/2014/main" val="3709905194"/>
+                    </a:ext>
+                  </a:extLst>
+                </a:gridCol>
+                <a:gridCol w="983671">
+                  <a:extLst>
+                    <a:ext uri="{9D8B030D-6E8A-4147-A177-3AD203B41FA5}">
+                      <a16:colId xmlns:a16="http://schemas.microsoft.com/office/drawing/2014/main" val="3999474005"/>
+                    </a:ext>
+                  </a:extLst>
+                </a:gridCol>
+              </a:tblGrid>
+              <a:tr h="708030">
+                <a:tc>
+                  <a:txBody>
+                    <a:bodyPr/>
+                    <a:lstStyle/>
+                    <a:p>
+                      <a:endParaRPr lang="es-CL" sz="1400" dirty="0"/>
+                    </a:p>
+                  </a:txBody>
+                  <a:tcPr/>
+                </a:tc>
+                <a:tc>
+                  <a:txBody>
+                    <a:bodyPr/>
+                    <a:lstStyle/>
+                    <a:p>
+                      <a:r>
+                        <a:rPr lang="es-CL" sz="1400" dirty="0"/>
+                        <a:t>APP</a:t>
+                      </a:r>
+                    </a:p>
+                  </a:txBody>
+                  <a:tcPr/>
+                </a:tc>
+                <a:tc>
+                  <a:txBody>
+                    <a:bodyPr/>
+                    <a:lstStyle/>
+                    <a:p>
+                      <a:r>
+                        <a:rPr lang="es-CL" sz="1400" dirty="0"/>
+                        <a:t>Red Social</a:t>
+                      </a:r>
+                    </a:p>
+                  </a:txBody>
+                  <a:tcPr/>
+                </a:tc>
+                <a:tc>
+                  <a:txBody>
+                    <a:bodyPr/>
+                    <a:lstStyle/>
+                    <a:p>
+                      <a:r>
+                        <a:rPr lang="es-CL" sz="1400" baseline="0" dirty="0"/>
+                        <a:t>Gratis</a:t>
+                      </a:r>
+                    </a:p>
+                  </a:txBody>
+                  <a:tcPr/>
+                </a:tc>
+                <a:tc>
+                  <a:txBody>
+                    <a:bodyPr/>
+                    <a:lstStyle/>
+                    <a:p>
+                      <a:r>
+                        <a:rPr lang="es-CL" sz="1400" dirty="0"/>
+                        <a:t>Pagada</a:t>
+                      </a:r>
+                    </a:p>
+                  </a:txBody>
+                  <a:tcPr/>
+                </a:tc>
+                <a:tc>
+                  <a:txBody>
+                    <a:bodyPr/>
+                    <a:lstStyle/>
+                    <a:p>
+                      <a:pPr marL="0" marR="0" lvl="0" indent="0" algn="l" defTabSz="457200" rtl="0" eaLnBrk="1" fontAlgn="auto" latinLnBrk="0" hangingPunct="1">
+                        <a:lnSpc>
+                          <a:spcPct val="100000"/>
+                        </a:lnSpc>
+                        <a:spcBef>
+                          <a:spcPts val="0"/>
+                        </a:spcBef>
+                        <a:spcAft>
+                          <a:spcPts val="0"/>
+                        </a:spcAft>
+                        <a:buClrTx/>
+                        <a:buSzTx/>
+                        <a:buFontTx/>
+                        <a:buNone/>
+                        <a:tabLst/>
+                        <a:defRPr/>
+                      </a:pPr>
+                      <a:r>
+                        <a:rPr lang="es-CL" sz="1400" dirty="0"/>
+                        <a:t>Recetas</a:t>
+                      </a:r>
+                    </a:p>
+                    <a:p>
+                      <a:endParaRPr lang="es-CL" sz="1400" dirty="0"/>
+                    </a:p>
+                  </a:txBody>
+                  <a:tcPr/>
+                </a:tc>
+                <a:tc>
+                  <a:txBody>
+                    <a:bodyPr/>
+                    <a:lstStyle/>
+                    <a:p>
+                      <a:pPr marL="0" marR="0" lvl="0" indent="0" algn="l" defTabSz="457200" rtl="0" eaLnBrk="1" fontAlgn="auto" latinLnBrk="0" hangingPunct="1">
+                        <a:lnSpc>
+                          <a:spcPct val="100000"/>
+                        </a:lnSpc>
+                        <a:spcBef>
+                          <a:spcPts val="0"/>
+                        </a:spcBef>
+                        <a:spcAft>
+                          <a:spcPts val="0"/>
+                        </a:spcAft>
+                        <a:buClrTx/>
+                        <a:buSzTx/>
+                        <a:buFontTx/>
+                        <a:buNone/>
+                        <a:tabLst/>
+                        <a:defRPr/>
+                      </a:pPr>
+                      <a:r>
+                        <a:rPr lang="es-CL" sz="1400" dirty="0"/>
+                        <a:t>Especialistas</a:t>
+                      </a:r>
+                    </a:p>
+                    <a:p>
+                      <a:endParaRPr lang="es-CL" sz="1400" dirty="0"/>
+                    </a:p>
+                  </a:txBody>
+                  <a:tcPr/>
+                </a:tc>
+                <a:tc>
+                  <a:txBody>
+                    <a:bodyPr/>
+                    <a:lstStyle/>
+                    <a:p>
+                      <a:r>
+                        <a:rPr lang="es-CL" sz="1400" dirty="0"/>
+                        <a:t>Locales</a:t>
+                      </a:r>
+                    </a:p>
+                  </a:txBody>
+                  <a:tcPr/>
+                </a:tc>
+                <a:tc>
+                  <a:txBody>
+                    <a:bodyPr/>
+                    <a:lstStyle/>
+                    <a:p>
+                      <a:r>
+                        <a:rPr lang="es-CL" sz="1400" dirty="0"/>
+                        <a:t>Actividades</a:t>
+                      </a:r>
+                    </a:p>
+                  </a:txBody>
+                  <a:tcPr/>
+                </a:tc>
+                <a:tc>
+                  <a:txBody>
+                    <a:bodyPr/>
+                    <a:lstStyle/>
+                    <a:p>
+                      <a:r>
+                        <a:rPr lang="es-CL" sz="1400" dirty="0"/>
+                        <a:t>ONG</a:t>
+                      </a:r>
+                    </a:p>
+                  </a:txBody>
+                  <a:tcPr/>
+                </a:tc>
+                <a:tc>
+                  <a:txBody>
+                    <a:bodyPr/>
+                    <a:lstStyle/>
+                    <a:p>
+                      <a:r>
+                        <a:rPr lang="es-CL" sz="1400" dirty="0"/>
+                        <a:t>Componentes de alimentos</a:t>
+                      </a:r>
+                    </a:p>
+                  </a:txBody>
+                  <a:tcPr/>
+                </a:tc>
+                <a:tc>
+                  <a:txBody>
+                    <a:bodyPr/>
+                    <a:lstStyle/>
+                    <a:p>
+                      <a:r>
+                        <a:rPr lang="es-CL" sz="1400" dirty="0"/>
+                        <a:t>Medicamentos</a:t>
+                      </a:r>
+                    </a:p>
+                  </a:txBody>
+                  <a:tcPr/>
+                </a:tc>
+                <a:extLst>
+                  <a:ext uri="{0D108BD9-81ED-4DB2-BD59-A6C34878D82A}">
+                    <a16:rowId xmlns:a16="http://schemas.microsoft.com/office/drawing/2014/main" val="3621860313"/>
+                  </a:ext>
+                </a:extLst>
+              </a:tr>
+              <a:tr h="584273">
+                <a:tc>
+                  <a:txBody>
+                    <a:bodyPr/>
+                    <a:lstStyle/>
+                    <a:p>
+                      <a:pPr marL="0" marR="0" lvl="0" indent="0" algn="l" defTabSz="914400" rtl="0" eaLnBrk="1" fontAlgn="auto" latinLnBrk="0" hangingPunct="1">
+                        <a:lnSpc>
+                          <a:spcPct val="100000"/>
+                        </a:lnSpc>
+                        <a:spcBef>
+                          <a:spcPts val="0"/>
+                        </a:spcBef>
+                        <a:spcAft>
+                          <a:spcPts val="0"/>
+                        </a:spcAft>
+                        <a:buClrTx/>
+                        <a:buSzTx/>
+                        <a:buFontTx/>
+                        <a:buNone/>
+                        <a:tabLst/>
+                        <a:defRPr/>
+                      </a:pPr>
+                      <a:r>
+                        <a:rPr lang="es-CL" dirty="0"/>
+                        <a:t>Celiacos Chile</a:t>
+                      </a:r>
+                    </a:p>
+                  </a:txBody>
+                  <a:tcPr/>
+                </a:tc>
+                <a:tc>
+                  <a:txBody>
+                    <a:bodyPr/>
+                    <a:lstStyle/>
+                    <a:p>
+                      <a:endParaRPr lang="es-CL" dirty="0"/>
+                    </a:p>
+                  </a:txBody>
+                  <a:tcPr/>
+                </a:tc>
+                <a:tc>
+                  <a:txBody>
+                    <a:bodyPr/>
+                    <a:lstStyle/>
+                    <a:p>
+                      <a:r>
+                        <a:rPr lang="es-CL" dirty="0"/>
+                        <a:t>x</a:t>
+                      </a:r>
+                    </a:p>
+                  </a:txBody>
+                  <a:tcPr/>
+                </a:tc>
+                <a:tc>
+                  <a:txBody>
+                    <a:bodyPr/>
+                    <a:lstStyle/>
+                    <a:p>
+                      <a:r>
+                        <a:rPr lang="es-CL" baseline="0" dirty="0"/>
+                        <a:t>x</a:t>
+                      </a:r>
+                    </a:p>
+                  </a:txBody>
+                  <a:tcPr/>
+                </a:tc>
+                <a:tc>
+                  <a:txBody>
+                    <a:bodyPr/>
+                    <a:lstStyle/>
+                    <a:p>
+                      <a:endParaRPr lang="es-CL" dirty="0"/>
+                    </a:p>
+                  </a:txBody>
+                  <a:tcPr/>
+                </a:tc>
+                <a:tc>
+                  <a:txBody>
+                    <a:bodyPr/>
+                    <a:lstStyle/>
+                    <a:p>
+                      <a:r>
+                        <a:rPr lang="es-CL" dirty="0"/>
+                        <a:t>x</a:t>
+                      </a:r>
+                    </a:p>
+                  </a:txBody>
+                  <a:tcPr/>
+                </a:tc>
+                <a:tc>
+                  <a:txBody>
+                    <a:bodyPr/>
+                    <a:lstStyle/>
+                    <a:p>
+                      <a:r>
+                        <a:rPr lang="es-CL" dirty="0"/>
+                        <a:t>x</a:t>
+                      </a:r>
+                    </a:p>
+                  </a:txBody>
+                  <a:tcPr/>
+                </a:tc>
+                <a:tc>
+                  <a:txBody>
+                    <a:bodyPr/>
+                    <a:lstStyle/>
+                    <a:p>
+                      <a:r>
+                        <a:rPr lang="es-CL" dirty="0"/>
+                        <a:t>x</a:t>
+                      </a:r>
+                    </a:p>
+                  </a:txBody>
+                  <a:tcPr/>
+                </a:tc>
+                <a:tc>
+                  <a:txBody>
+                    <a:bodyPr/>
+                    <a:lstStyle/>
+                    <a:p>
+                      <a:r>
+                        <a:rPr lang="es-CL" dirty="0"/>
+                        <a:t>x</a:t>
+                      </a:r>
+                    </a:p>
+                  </a:txBody>
+                  <a:tcPr/>
+                </a:tc>
+                <a:tc>
+                  <a:txBody>
+                    <a:bodyPr/>
+                    <a:lstStyle/>
+                    <a:p>
+                      <a:r>
+                        <a:rPr lang="es-CL" dirty="0"/>
+                        <a:t>x</a:t>
+                      </a:r>
+                    </a:p>
+                  </a:txBody>
+                  <a:tcPr/>
+                </a:tc>
+                <a:tc>
+                  <a:txBody>
+                    <a:bodyPr/>
+                    <a:lstStyle/>
+                    <a:p>
+                      <a:r>
+                        <a:rPr lang="es-CL" dirty="0"/>
+                        <a:t>X</a:t>
+                      </a:r>
+                    </a:p>
+                  </a:txBody>
+                  <a:tcPr/>
+                </a:tc>
+                <a:tc>
+                  <a:txBody>
+                    <a:bodyPr/>
+                    <a:lstStyle/>
+                    <a:p>
+                      <a:r>
+                        <a:rPr lang="es-CL" dirty="0"/>
+                        <a:t>x</a:t>
+                      </a:r>
+                    </a:p>
+                  </a:txBody>
+                  <a:tcPr/>
+                </a:tc>
+                <a:extLst>
+                  <a:ext uri="{0D108BD9-81ED-4DB2-BD59-A6C34878D82A}">
+                    <a16:rowId xmlns:a16="http://schemas.microsoft.com/office/drawing/2014/main" val="4011701112"/>
+                  </a:ext>
+                </a:extLst>
+              </a:tr>
+              <a:tr h="354015">
+                <a:tc>
+                  <a:txBody>
+                    <a:bodyPr/>
+                    <a:lstStyle/>
+                    <a:p>
+                      <a:pPr marL="0" marR="0" lvl="0" indent="0" algn="l" defTabSz="914400" rtl="0" eaLnBrk="1" fontAlgn="auto" latinLnBrk="0" hangingPunct="1">
+                        <a:lnSpc>
+                          <a:spcPct val="100000"/>
+                        </a:lnSpc>
+                        <a:spcBef>
+                          <a:spcPts val="0"/>
+                        </a:spcBef>
+                        <a:spcAft>
+                          <a:spcPts val="0"/>
+                        </a:spcAft>
+                        <a:buClrTx/>
+                        <a:buSzTx/>
+                        <a:buFontTx/>
+                        <a:buNone/>
+                        <a:tabLst/>
+                        <a:defRPr/>
+                      </a:pPr>
+                      <a:r>
+                        <a:rPr lang="es-CL" dirty="0"/>
+                        <a:t>Celiacos en Chile</a:t>
+                      </a:r>
+                    </a:p>
+                  </a:txBody>
+                  <a:tcPr/>
+                </a:tc>
+                <a:tc>
+                  <a:txBody>
+                    <a:bodyPr/>
+                    <a:lstStyle/>
+                    <a:p>
+                      <a:endParaRPr lang="es-CL" dirty="0"/>
+                    </a:p>
+                  </a:txBody>
+                  <a:tcPr/>
+                </a:tc>
+                <a:tc>
+                  <a:txBody>
+                    <a:bodyPr/>
+                    <a:lstStyle/>
+                    <a:p>
+                      <a:r>
+                        <a:rPr lang="es-CL" dirty="0"/>
+                        <a:t>x</a:t>
+                      </a:r>
+                    </a:p>
+                  </a:txBody>
+                  <a:tcPr/>
+                </a:tc>
+                <a:tc>
+                  <a:txBody>
+                    <a:bodyPr/>
+                    <a:lstStyle/>
+                    <a:p>
+                      <a:r>
+                        <a:rPr lang="es-CL" baseline="0" dirty="0"/>
+                        <a:t>x</a:t>
+                      </a:r>
+                    </a:p>
+                  </a:txBody>
+                  <a:tcPr/>
+                </a:tc>
+                <a:tc>
+                  <a:txBody>
+                    <a:bodyPr/>
+                    <a:lstStyle/>
+                    <a:p>
+                      <a:endParaRPr lang="es-CL"/>
+                    </a:p>
+                  </a:txBody>
+                  <a:tcPr/>
+                </a:tc>
+                <a:tc>
+                  <a:txBody>
+                    <a:bodyPr/>
+                    <a:lstStyle/>
+                    <a:p>
+                      <a:r>
+                        <a:rPr lang="es-CL" dirty="0"/>
+                        <a:t>x</a:t>
+                      </a:r>
+                    </a:p>
+                  </a:txBody>
+                  <a:tcPr/>
+                </a:tc>
+                <a:tc>
+                  <a:txBody>
+                    <a:bodyPr/>
+                    <a:lstStyle/>
+                    <a:p>
+                      <a:r>
+                        <a:rPr lang="es-CL" dirty="0"/>
+                        <a:t>x</a:t>
+                      </a:r>
+                    </a:p>
+                  </a:txBody>
+                  <a:tcPr/>
+                </a:tc>
+                <a:tc>
+                  <a:txBody>
+                    <a:bodyPr/>
+                    <a:lstStyle/>
+                    <a:p>
+                      <a:r>
+                        <a:rPr lang="es-CL" dirty="0"/>
+                        <a:t>x</a:t>
+                      </a:r>
+                    </a:p>
+                  </a:txBody>
+                  <a:tcPr/>
+                </a:tc>
+                <a:tc>
+                  <a:txBody>
+                    <a:bodyPr/>
+                    <a:lstStyle/>
+                    <a:p>
+                      <a:r>
+                        <a:rPr lang="es-CL" dirty="0"/>
+                        <a:t>x</a:t>
+                      </a:r>
+                    </a:p>
+                  </a:txBody>
+                  <a:tcPr/>
+                </a:tc>
+                <a:tc>
+                  <a:txBody>
+                    <a:bodyPr/>
+                    <a:lstStyle/>
+                    <a:p>
+                      <a:endParaRPr lang="es-CL"/>
+                    </a:p>
+                  </a:txBody>
+                  <a:tcPr/>
+                </a:tc>
+                <a:tc>
+                  <a:txBody>
+                    <a:bodyPr/>
+                    <a:lstStyle/>
+                    <a:p>
+                      <a:r>
+                        <a:rPr lang="es-CL" dirty="0"/>
+                        <a:t>X</a:t>
+                      </a:r>
+                    </a:p>
+                  </a:txBody>
+                  <a:tcPr/>
+                </a:tc>
+                <a:tc>
+                  <a:txBody>
+                    <a:bodyPr/>
+                    <a:lstStyle/>
+                    <a:p>
+                      <a:r>
+                        <a:rPr lang="es-CL" dirty="0"/>
+                        <a:t>X</a:t>
+                      </a:r>
+                    </a:p>
+                  </a:txBody>
+                  <a:tcPr/>
+                </a:tc>
+                <a:extLst>
+                  <a:ext uri="{0D108BD9-81ED-4DB2-BD59-A6C34878D82A}">
+                    <a16:rowId xmlns:a16="http://schemas.microsoft.com/office/drawing/2014/main" val="3157451993"/>
+                  </a:ext>
+                </a:extLst>
+              </a:tr>
+              <a:tr h="354015">
+                <a:tc>
+                  <a:txBody>
+                    <a:bodyPr/>
+                    <a:lstStyle/>
+                    <a:p>
+                      <a:pPr marL="0" marR="0" lvl="0" indent="0" algn="l" defTabSz="914400" rtl="0" eaLnBrk="1" fontAlgn="auto" latinLnBrk="0" hangingPunct="1">
+                        <a:lnSpc>
+                          <a:spcPct val="100000"/>
+                        </a:lnSpc>
+                        <a:spcBef>
+                          <a:spcPts val="0"/>
+                        </a:spcBef>
+                        <a:spcAft>
+                          <a:spcPts val="0"/>
+                        </a:spcAft>
+                        <a:buClrTx/>
+                        <a:buSzTx/>
+                        <a:buFontTx/>
+                        <a:buNone/>
+                        <a:tabLst/>
+                        <a:defRPr/>
+                      </a:pPr>
+                      <a:r>
+                        <a:rPr lang="es-CL" dirty="0"/>
+                        <a:t>Celiacos Santiago</a:t>
+                      </a:r>
+                    </a:p>
+                  </a:txBody>
+                  <a:tcPr/>
+                </a:tc>
+                <a:tc>
+                  <a:txBody>
+                    <a:bodyPr/>
+                    <a:lstStyle/>
+                    <a:p>
+                      <a:endParaRPr lang="es-CL" dirty="0"/>
+                    </a:p>
+                  </a:txBody>
+                  <a:tcPr/>
+                </a:tc>
+                <a:tc>
+                  <a:txBody>
+                    <a:bodyPr/>
+                    <a:lstStyle/>
+                    <a:p>
+                      <a:r>
+                        <a:rPr lang="es-CL" dirty="0"/>
+                        <a:t>x</a:t>
+                      </a:r>
+                    </a:p>
+                  </a:txBody>
+                  <a:tcPr/>
+                </a:tc>
+                <a:tc>
+                  <a:txBody>
+                    <a:bodyPr/>
+                    <a:lstStyle/>
+                    <a:p>
+                      <a:r>
+                        <a:rPr lang="es-CL" baseline="0" dirty="0"/>
+                        <a:t>x</a:t>
+                      </a:r>
+                    </a:p>
+                  </a:txBody>
+                  <a:tcPr/>
+                </a:tc>
+                <a:tc>
+                  <a:txBody>
+                    <a:bodyPr/>
+                    <a:lstStyle/>
+                    <a:p>
+                      <a:endParaRPr lang="es-CL" dirty="0"/>
+                    </a:p>
+                  </a:txBody>
+                  <a:tcPr/>
+                </a:tc>
+                <a:tc>
+                  <a:txBody>
+                    <a:bodyPr/>
+                    <a:lstStyle/>
+                    <a:p>
+                      <a:r>
+                        <a:rPr lang="es-CL" dirty="0"/>
+                        <a:t>x</a:t>
+                      </a:r>
+                    </a:p>
+                  </a:txBody>
+                  <a:tcPr/>
+                </a:tc>
+                <a:tc>
+                  <a:txBody>
+                    <a:bodyPr/>
+                    <a:lstStyle/>
+                    <a:p>
+                      <a:r>
+                        <a:rPr lang="es-CL" dirty="0"/>
+                        <a:t>x</a:t>
+                      </a:r>
+                    </a:p>
+                  </a:txBody>
+                  <a:tcPr/>
+                </a:tc>
+                <a:tc>
+                  <a:txBody>
+                    <a:bodyPr/>
+                    <a:lstStyle/>
+                    <a:p>
+                      <a:r>
+                        <a:rPr lang="es-CL" dirty="0"/>
+                        <a:t>x</a:t>
+                      </a:r>
+                    </a:p>
+                  </a:txBody>
+                  <a:tcPr/>
+                </a:tc>
+                <a:tc>
+                  <a:txBody>
+                    <a:bodyPr/>
+                    <a:lstStyle/>
+                    <a:p>
+                      <a:r>
+                        <a:rPr lang="es-CL" dirty="0"/>
+                        <a:t>x</a:t>
+                      </a:r>
+                    </a:p>
+                  </a:txBody>
+                  <a:tcPr/>
+                </a:tc>
+                <a:tc>
+                  <a:txBody>
+                    <a:bodyPr/>
+                    <a:lstStyle/>
+                    <a:p>
+                      <a:endParaRPr lang="es-CL" dirty="0"/>
+                    </a:p>
+                  </a:txBody>
+                  <a:tcPr/>
+                </a:tc>
+                <a:tc>
+                  <a:txBody>
+                    <a:bodyPr/>
+                    <a:lstStyle/>
+                    <a:p>
+                      <a:endParaRPr lang="es-CL" dirty="0"/>
+                    </a:p>
+                  </a:txBody>
+                  <a:tcPr/>
+                </a:tc>
+                <a:tc>
+                  <a:txBody>
+                    <a:bodyPr/>
+                    <a:lstStyle/>
+                    <a:p>
+                      <a:r>
+                        <a:rPr lang="es-CL" dirty="0"/>
+                        <a:t>x</a:t>
+                      </a:r>
+                    </a:p>
+                  </a:txBody>
+                  <a:tcPr/>
+                </a:tc>
+                <a:extLst>
+                  <a:ext uri="{0D108BD9-81ED-4DB2-BD59-A6C34878D82A}">
+                    <a16:rowId xmlns:a16="http://schemas.microsoft.com/office/drawing/2014/main" val="2170066161"/>
+                  </a:ext>
+                </a:extLst>
+              </a:tr>
+              <a:tr h="408991">
+                <a:tc>
+                  <a:txBody>
+                    <a:bodyPr/>
+                    <a:lstStyle/>
+                    <a:p>
+                      <a:pPr marL="0" marR="0" lvl="0" indent="0" algn="l" defTabSz="914400" rtl="0" eaLnBrk="1" fontAlgn="auto" latinLnBrk="0" hangingPunct="1">
+                        <a:lnSpc>
+                          <a:spcPct val="100000"/>
+                        </a:lnSpc>
+                        <a:spcBef>
+                          <a:spcPts val="0"/>
+                        </a:spcBef>
+                        <a:spcAft>
+                          <a:spcPts val="0"/>
+                        </a:spcAft>
+                        <a:buClrTx/>
+                        <a:buSzTx/>
+                        <a:buFontTx/>
+                        <a:buNone/>
+                        <a:tabLst/>
+                        <a:defRPr/>
+                      </a:pPr>
+                      <a:endParaRPr lang="es-CL" dirty="0"/>
+                    </a:p>
+                  </a:txBody>
+                  <a:tcPr/>
+                </a:tc>
+                <a:tc>
+                  <a:txBody>
+                    <a:bodyPr/>
+                    <a:lstStyle/>
+                    <a:p>
+                      <a:endParaRPr lang="es-CL" dirty="0"/>
+                    </a:p>
+                  </a:txBody>
+                  <a:tcPr/>
+                </a:tc>
+                <a:tc>
+                  <a:txBody>
+                    <a:bodyPr/>
+                    <a:lstStyle/>
+                    <a:p>
+                      <a:endParaRPr lang="es-CL"/>
+                    </a:p>
+                  </a:txBody>
+                  <a:tcPr/>
+                </a:tc>
+                <a:tc>
+                  <a:txBody>
+                    <a:bodyPr/>
+                    <a:lstStyle/>
+                    <a:p>
+                      <a:endParaRPr lang="es-CL" baseline="0" dirty="0"/>
+                    </a:p>
+                  </a:txBody>
+                  <a:tcPr/>
+                </a:tc>
+                <a:tc>
+                  <a:txBody>
+                    <a:bodyPr/>
+                    <a:lstStyle/>
+                    <a:p>
+                      <a:endParaRPr lang="es-CL" dirty="0"/>
+                    </a:p>
+                  </a:txBody>
+                  <a:tcPr/>
+                </a:tc>
+                <a:tc>
+                  <a:txBody>
+                    <a:bodyPr/>
+                    <a:lstStyle/>
+                    <a:p>
+                      <a:endParaRPr lang="es-CL" dirty="0"/>
+                    </a:p>
+                  </a:txBody>
+                  <a:tcPr/>
+                </a:tc>
+                <a:tc>
+                  <a:txBody>
+                    <a:bodyPr/>
+                    <a:lstStyle/>
+                    <a:p>
+                      <a:endParaRPr lang="es-CL" dirty="0"/>
+                    </a:p>
+                  </a:txBody>
+                  <a:tcPr/>
+                </a:tc>
+                <a:tc>
+                  <a:txBody>
+                    <a:bodyPr/>
+                    <a:lstStyle/>
+                    <a:p>
+                      <a:endParaRPr lang="es-CL" dirty="0"/>
+                    </a:p>
+                  </a:txBody>
+                  <a:tcPr/>
+                </a:tc>
+                <a:tc>
+                  <a:txBody>
+                    <a:bodyPr/>
+                    <a:lstStyle/>
+                    <a:p>
+                      <a:endParaRPr lang="es-CL" dirty="0"/>
+                    </a:p>
+                  </a:txBody>
+                  <a:tcPr/>
+                </a:tc>
+                <a:tc>
+                  <a:txBody>
+                    <a:bodyPr/>
+                    <a:lstStyle/>
+                    <a:p>
+                      <a:endParaRPr lang="es-CL" dirty="0"/>
+                    </a:p>
+                  </a:txBody>
+                  <a:tcPr/>
+                </a:tc>
+                <a:tc>
+                  <a:txBody>
+                    <a:bodyPr/>
+                    <a:lstStyle/>
+                    <a:p>
+                      <a:endParaRPr lang="es-CL" dirty="0"/>
+                    </a:p>
+                  </a:txBody>
+                  <a:tcPr/>
+                </a:tc>
+                <a:tc>
+                  <a:txBody>
+                    <a:bodyPr/>
+                    <a:lstStyle/>
+                    <a:p>
+                      <a:endParaRPr lang="es-CL" dirty="0"/>
+                    </a:p>
+                  </a:txBody>
+                  <a:tcPr/>
+                </a:tc>
+                <a:extLst>
+                  <a:ext uri="{0D108BD9-81ED-4DB2-BD59-A6C34878D82A}">
+                    <a16:rowId xmlns:a16="http://schemas.microsoft.com/office/drawing/2014/main" val="1266673640"/>
+                  </a:ext>
+                </a:extLst>
+              </a:tr>
+              <a:tr h="408991">
+                <a:tc>
+                  <a:txBody>
+                    <a:bodyPr/>
+                    <a:lstStyle/>
+                    <a:p>
+                      <a:endParaRPr lang="es-CL" dirty="0"/>
+                    </a:p>
+                  </a:txBody>
+                  <a:tcPr/>
+                </a:tc>
+                <a:tc>
+                  <a:txBody>
+                    <a:bodyPr/>
+                    <a:lstStyle/>
+                    <a:p>
+                      <a:endParaRPr lang="es-CL" dirty="0"/>
+                    </a:p>
+                  </a:txBody>
+                  <a:tcPr/>
+                </a:tc>
+                <a:tc>
+                  <a:txBody>
+                    <a:bodyPr/>
+                    <a:lstStyle/>
+                    <a:p>
+                      <a:endParaRPr lang="es-CL" dirty="0"/>
+                    </a:p>
+                  </a:txBody>
+                  <a:tcPr/>
+                </a:tc>
+                <a:tc>
+                  <a:txBody>
+                    <a:bodyPr/>
+                    <a:lstStyle/>
+                    <a:p>
+                      <a:endParaRPr lang="es-CL" baseline="0" dirty="0"/>
+                    </a:p>
+                  </a:txBody>
+                  <a:tcPr/>
+                </a:tc>
+                <a:tc>
+                  <a:txBody>
+                    <a:bodyPr/>
+                    <a:lstStyle/>
+                    <a:p>
+                      <a:endParaRPr lang="es-CL" dirty="0"/>
+                    </a:p>
+                  </a:txBody>
+                  <a:tcPr/>
+                </a:tc>
+                <a:tc>
+                  <a:txBody>
+                    <a:bodyPr/>
+                    <a:lstStyle/>
+                    <a:p>
+                      <a:endParaRPr lang="es-CL" dirty="0"/>
+                    </a:p>
+                  </a:txBody>
+                  <a:tcPr/>
+                </a:tc>
+                <a:tc>
+                  <a:txBody>
+                    <a:bodyPr/>
+                    <a:lstStyle/>
+                    <a:p>
+                      <a:endParaRPr lang="es-CL"/>
+                    </a:p>
+                  </a:txBody>
+                  <a:tcPr/>
+                </a:tc>
+                <a:tc>
+                  <a:txBody>
+                    <a:bodyPr/>
+                    <a:lstStyle/>
+                    <a:p>
+                      <a:endParaRPr lang="es-CL" dirty="0"/>
+                    </a:p>
+                  </a:txBody>
+                  <a:tcPr/>
+                </a:tc>
+                <a:tc>
+                  <a:txBody>
+                    <a:bodyPr/>
+                    <a:lstStyle/>
+                    <a:p>
+                      <a:endParaRPr lang="es-CL" dirty="0"/>
+                    </a:p>
+                  </a:txBody>
+                  <a:tcPr/>
+                </a:tc>
+                <a:tc>
+                  <a:txBody>
+                    <a:bodyPr/>
+                    <a:lstStyle/>
+                    <a:p>
+                      <a:endParaRPr lang="es-CL" dirty="0"/>
+                    </a:p>
+                  </a:txBody>
+                  <a:tcPr/>
+                </a:tc>
+                <a:tc>
+                  <a:txBody>
+                    <a:bodyPr/>
+                    <a:lstStyle/>
+                    <a:p>
+                      <a:endParaRPr lang="es-CL" dirty="0"/>
+                    </a:p>
+                  </a:txBody>
+                  <a:tcPr/>
+                </a:tc>
+                <a:tc>
+                  <a:txBody>
+                    <a:bodyPr/>
+                    <a:lstStyle/>
+                    <a:p>
+                      <a:endParaRPr lang="es-CL" dirty="0"/>
+                    </a:p>
+                  </a:txBody>
+                  <a:tcPr/>
+                </a:tc>
+                <a:extLst>
+                  <a:ext uri="{0D108BD9-81ED-4DB2-BD59-A6C34878D82A}">
+                    <a16:rowId xmlns:a16="http://schemas.microsoft.com/office/drawing/2014/main" val="4155803451"/>
+                  </a:ext>
+                </a:extLst>
+              </a:tr>
+            </a:tbl>
+          </a:graphicData>
+        </a:graphic>
+      </p:graphicFrame>
+    </p:spTree>
+    <p:extLst>
+      <p:ext uri="{BB962C8B-B14F-4D97-AF65-F5344CB8AC3E}">
+        <p14:creationId xmlns:p14="http://schemas.microsoft.com/office/powerpoint/2010/main" val="682794018"/>
+      </p:ext>
+    </p:extLst>
+  </p:cSld>
+  <p:clrMapOvr>
+    <a:masterClrMapping/>
+  </p:clrMapOvr>
+</p:sld>
+</file>
+
 <file path=ppt/slides/slide2.xml><?xml version="1.0" encoding="utf-8"?>
 <p:sld xmlns:a="http://schemas.openxmlformats.org/drawingml/2006/main" xmlns:r="http://schemas.openxmlformats.org/officeDocument/2006/relationships" xmlns:p="http://schemas.openxmlformats.org/presentationml/2006/main">
   <p:cSld>
@@ -6955,7 +8255,7 @@
         </p:nvSpPr>
         <p:spPr>
           <a:xfrm>
-            <a:off x="400878" y="-64799"/>
+            <a:off x="345460" y="198437"/>
             <a:ext cx="10515600" cy="1325563"/>
           </a:xfrm>
         </p:spPr>
@@ -6965,7 +8265,7 @@
           <a:p>
             <a:r>
               <a:rPr lang="es-CL" dirty="0"/>
-              <a:t>Comparaciones</a:t>
+              <a:t>Comparaciones de app </a:t>
             </a:r>
           </a:p>
         </p:txBody>
@@ -6986,13 +8286,13 @@
             <p:ph idx="1"/>
             <p:extLst>
               <p:ext uri="{D42A27DB-BD31-4B8C-83A1-F6EECF244321}">
-                <p14:modId xmlns:p14="http://schemas.microsoft.com/office/powerpoint/2010/main" val="2891657393"/>
+                <p14:modId xmlns:p14="http://schemas.microsoft.com/office/powerpoint/2010/main" val="2627845467"/>
               </p:ext>
             </p:extLst>
           </p:nvPr>
         </p:nvGraphicFramePr>
         <p:xfrm>
-          <a:off x="8602" y="1887698"/>
+          <a:off x="-5253" y="1887698"/>
           <a:ext cx="12183398" cy="3953782"/>
         </p:xfrm>
         <a:graphic>
@@ -7379,16 +8679,6 @@
                     <a:bodyPr/>
                     <a:lstStyle/>
                     <a:p>
-                      <a:endParaRPr lang="es-CL" dirty="0"/>
-                    </a:p>
-                  </a:txBody>
-                  <a:tcPr/>
-                </a:tc>
-                <a:tc>
-                  <a:txBody>
-                    <a:bodyPr/>
-                    <a:lstStyle/>
-                    <a:p>
                       <a:r>
                         <a:rPr lang="es-CL" dirty="0"/>
                         <a:t>x</a:t>
@@ -7402,16 +8692,6 @@
                     <a:bodyPr/>
                     <a:lstStyle/>
                     <a:p>
-                      <a:endParaRPr lang="es-CL" dirty="0"/>
-                    </a:p>
-                  </a:txBody>
-                  <a:tcPr/>
-                </a:tc>
-                <a:tc>
-                  <a:txBody>
-                    <a:bodyPr/>
-                    <a:lstStyle/>
-                    <a:p>
                       <a:r>
                         <a:rPr lang="es-CL" dirty="0"/>
                         <a:t>x</a:t>
@@ -7427,6 +8707,32 @@
                     <a:p>
                       <a:r>
                         <a:rPr lang="es-CL" dirty="0"/>
+                        <a:t>x</a:t>
+                      </a:r>
+                    </a:p>
+                  </a:txBody>
+                  <a:tcPr/>
+                </a:tc>
+                <a:tc>
+                  <a:txBody>
+                    <a:bodyPr/>
+                    <a:lstStyle/>
+                    <a:p>
+                      <a:r>
+                        <a:rPr lang="es-CL" dirty="0"/>
+                        <a:t>x</a:t>
+                      </a:r>
+                    </a:p>
+                  </a:txBody>
+                  <a:tcPr/>
+                </a:tc>
+                <a:tc>
+                  <a:txBody>
+                    <a:bodyPr/>
+                    <a:lstStyle/>
+                    <a:p>
+                      <a:r>
+                        <a:rPr lang="es-CL" dirty="0"/>
                         <a:t>X</a:t>
                       </a:r>
                     </a:p>
@@ -7438,7 +8744,10 @@
                     <a:bodyPr/>
                     <a:lstStyle/>
                     <a:p>
-                      <a:endParaRPr lang="es-CL" dirty="0"/>
+                      <a:r>
+                        <a:rPr lang="es-CL" dirty="0"/>
+                        <a:t>x</a:t>
+                      </a:r>
                     </a:p>
                   </a:txBody>
                   <a:tcPr/>
@@ -8095,6 +9404,262 @@
     <p:extLst>
       <p:ext uri="{BB962C8B-B14F-4D97-AF65-F5344CB8AC3E}">
         <p14:creationId xmlns:p14="http://schemas.microsoft.com/office/powerpoint/2010/main" val="2590939977"/>
+      </p:ext>
+    </p:extLst>
+  </p:cSld>
+  <p:clrMapOvr>
+    <a:masterClrMapping/>
+  </p:clrMapOvr>
+</p:sld>
+</file>
+
+<file path=ppt/slides/slide8.xml><?xml version="1.0" encoding="utf-8"?>
+<p:sld xmlns:a="http://schemas.openxmlformats.org/drawingml/2006/main" xmlns:r="http://schemas.openxmlformats.org/officeDocument/2006/relationships" xmlns:p="http://schemas.openxmlformats.org/presentationml/2006/main">
+  <p:cSld>
+    <p:spTree>
+      <p:nvGrpSpPr>
+        <p:cNvPr id="1" name=""/>
+        <p:cNvGrpSpPr/>
+        <p:nvPr/>
+      </p:nvGrpSpPr>
+      <p:grpSpPr>
+        <a:xfrm>
+          <a:off x="0" y="0"/>
+          <a:ext cx="0" cy="0"/>
+          <a:chOff x="0" y="0"/>
+          <a:chExt cx="0" cy="0"/>
+        </a:xfrm>
+      </p:grpSpPr>
+      <p:sp>
+        <p:nvSpPr>
+          <p:cNvPr id="2" name="Título 1">
+            <a:extLst>
+              <a:ext uri="{FF2B5EF4-FFF2-40B4-BE49-F238E27FC236}">
+                <a16:creationId xmlns:a16="http://schemas.microsoft.com/office/drawing/2014/main" id="{FF0354DC-A145-4D8A-B438-FA1AD2ED5AFC}"/>
+              </a:ext>
+            </a:extLst>
+          </p:cNvPr>
+          <p:cNvSpPr>
+            <a:spLocks noGrp="1"/>
+          </p:cNvSpPr>
+          <p:nvPr>
+            <p:ph type="title"/>
+          </p:nvPr>
+        </p:nvSpPr>
+        <p:spPr/>
+        <p:txBody>
+          <a:bodyPr/>
+          <a:lstStyle/>
+          <a:p>
+            <a:r>
+              <a:rPr lang="es-CL" dirty="0"/>
+              <a:t>Comparación en redes sociales </a:t>
+            </a:r>
+          </a:p>
+        </p:txBody>
+      </p:sp>
+      <p:sp>
+        <p:nvSpPr>
+          <p:cNvPr id="3" name="Marcador de contenido 2">
+            <a:extLst>
+              <a:ext uri="{FF2B5EF4-FFF2-40B4-BE49-F238E27FC236}">
+                <a16:creationId xmlns:a16="http://schemas.microsoft.com/office/drawing/2014/main" id="{5CCB6212-743F-4C59-99AC-860CB6E14739}"/>
+              </a:ext>
+            </a:extLst>
+          </p:cNvPr>
+          <p:cNvSpPr>
+            <a:spLocks noGrp="1"/>
+          </p:cNvSpPr>
+          <p:nvPr>
+            <p:ph idx="1"/>
+          </p:nvPr>
+        </p:nvSpPr>
+        <p:spPr>
+          <a:xfrm>
+            <a:off x="677332" y="1246909"/>
+            <a:ext cx="11306849" cy="683491"/>
+          </a:xfrm>
+        </p:spPr>
+        <p:txBody>
+          <a:bodyPr>
+            <a:normAutofit/>
+          </a:bodyPr>
+          <a:lstStyle/>
+          <a:p>
+            <a:r>
+              <a:rPr lang="es-CL" dirty="0"/>
+              <a:t>Facebook: Grupo celiacos Chile, perteneciente a  Fundación Convivir - </a:t>
+            </a:r>
+            <a:r>
+              <a:rPr lang="es-CL" b="1" dirty="0"/>
+              <a:t>18.754 integrantes</a:t>
+            </a:r>
+            <a:endParaRPr lang="es-CL" dirty="0"/>
+          </a:p>
+        </p:txBody>
+      </p:sp>
+      <p:pic>
+        <p:nvPicPr>
+          <p:cNvPr id="4" name="Imagen 3">
+            <a:extLst>
+              <a:ext uri="{FF2B5EF4-FFF2-40B4-BE49-F238E27FC236}">
+                <a16:creationId xmlns:a16="http://schemas.microsoft.com/office/drawing/2014/main" id="{A49AC3ED-8B38-486C-B879-7BB969099DDF}"/>
+              </a:ext>
+            </a:extLst>
+          </p:cNvPr>
+          <p:cNvPicPr>
+            <a:picLocks noChangeAspect="1"/>
+          </p:cNvPicPr>
+          <p:nvPr/>
+        </p:nvPicPr>
+        <p:blipFill>
+          <a:blip r:embed="rId2"/>
+          <a:stretch>
+            <a:fillRect/>
+          </a:stretch>
+        </p:blipFill>
+        <p:spPr>
+          <a:xfrm>
+            <a:off x="1305406" y="1930400"/>
+            <a:ext cx="9210675" cy="4457700"/>
+          </a:xfrm>
+          <a:prstGeom prst="rect">
+            <a:avLst/>
+          </a:prstGeom>
+        </p:spPr>
+      </p:pic>
+    </p:spTree>
+    <p:extLst>
+      <p:ext uri="{BB962C8B-B14F-4D97-AF65-F5344CB8AC3E}">
+        <p14:creationId xmlns:p14="http://schemas.microsoft.com/office/powerpoint/2010/main" val="1344385258"/>
+      </p:ext>
+    </p:extLst>
+  </p:cSld>
+  <p:clrMapOvr>
+    <a:masterClrMapping/>
+  </p:clrMapOvr>
+</p:sld>
+</file>
+
+<file path=ppt/slides/slide9.xml><?xml version="1.0" encoding="utf-8"?>
+<p:sld xmlns:a="http://schemas.openxmlformats.org/drawingml/2006/main" xmlns:r="http://schemas.openxmlformats.org/officeDocument/2006/relationships" xmlns:p="http://schemas.openxmlformats.org/presentationml/2006/main">
+  <p:cSld>
+    <p:spTree>
+      <p:nvGrpSpPr>
+        <p:cNvPr id="1" name=""/>
+        <p:cNvGrpSpPr/>
+        <p:nvPr/>
+      </p:nvGrpSpPr>
+      <p:grpSpPr>
+        <a:xfrm>
+          <a:off x="0" y="0"/>
+          <a:ext cx="0" cy="0"/>
+          <a:chOff x="0" y="0"/>
+          <a:chExt cx="0" cy="0"/>
+        </a:xfrm>
+      </p:grpSpPr>
+      <p:sp>
+        <p:nvSpPr>
+          <p:cNvPr id="2" name="Título 1">
+            <a:extLst>
+              <a:ext uri="{FF2B5EF4-FFF2-40B4-BE49-F238E27FC236}">
+                <a16:creationId xmlns:a16="http://schemas.microsoft.com/office/drawing/2014/main" id="{FF0354DC-A145-4D8A-B438-FA1AD2ED5AFC}"/>
+              </a:ext>
+            </a:extLst>
+          </p:cNvPr>
+          <p:cNvSpPr>
+            <a:spLocks noGrp="1"/>
+          </p:cNvSpPr>
+          <p:nvPr>
+            <p:ph type="title"/>
+          </p:nvPr>
+        </p:nvSpPr>
+        <p:spPr/>
+        <p:txBody>
+          <a:bodyPr/>
+          <a:lstStyle/>
+          <a:p>
+            <a:r>
+              <a:rPr lang="es-CL" dirty="0"/>
+              <a:t>Comparación en redes sociales </a:t>
+            </a:r>
+          </a:p>
+        </p:txBody>
+      </p:sp>
+      <p:sp>
+        <p:nvSpPr>
+          <p:cNvPr id="3" name="Marcador de contenido 2">
+            <a:extLst>
+              <a:ext uri="{FF2B5EF4-FFF2-40B4-BE49-F238E27FC236}">
+                <a16:creationId xmlns:a16="http://schemas.microsoft.com/office/drawing/2014/main" id="{5CCB6212-743F-4C59-99AC-860CB6E14739}"/>
+              </a:ext>
+            </a:extLst>
+          </p:cNvPr>
+          <p:cNvSpPr>
+            <a:spLocks noGrp="1"/>
+          </p:cNvSpPr>
+          <p:nvPr>
+            <p:ph idx="1"/>
+          </p:nvPr>
+        </p:nvSpPr>
+        <p:spPr>
+          <a:xfrm>
+            <a:off x="677332" y="1467203"/>
+            <a:ext cx="11223723" cy="463197"/>
+          </a:xfrm>
+        </p:spPr>
+        <p:txBody>
+          <a:bodyPr>
+            <a:normAutofit/>
+          </a:bodyPr>
+          <a:lstStyle/>
+          <a:p>
+            <a:r>
+              <a:rPr lang="es-CL" dirty="0"/>
+              <a:t>Facebook: Celiacos en Chile - 2494 integrantes</a:t>
+            </a:r>
+          </a:p>
+          <a:p>
+            <a:pPr marL="0" indent="0">
+              <a:buNone/>
+            </a:pPr>
+            <a:endParaRPr lang="es-CL" dirty="0"/>
+          </a:p>
+        </p:txBody>
+      </p:sp>
+      <p:pic>
+        <p:nvPicPr>
+          <p:cNvPr id="5" name="Imagen 4">
+            <a:extLst>
+              <a:ext uri="{FF2B5EF4-FFF2-40B4-BE49-F238E27FC236}">
+                <a16:creationId xmlns:a16="http://schemas.microsoft.com/office/drawing/2014/main" id="{A958F82A-82B8-4209-8372-60012AF43FEB}"/>
+              </a:ext>
+            </a:extLst>
+          </p:cNvPr>
+          <p:cNvPicPr>
+            <a:picLocks noChangeAspect="1"/>
+          </p:cNvPicPr>
+          <p:nvPr/>
+        </p:nvPicPr>
+        <p:blipFill rotWithShape="1">
+          <a:blip r:embed="rId2"/>
+          <a:srcRect/>
+          <a:stretch/>
+        </p:blipFill>
+        <p:spPr>
+          <a:xfrm>
+            <a:off x="2645880" y="1930400"/>
+            <a:ext cx="7286625" cy="4581525"/>
+          </a:xfrm>
+          <a:prstGeom prst="rect">
+            <a:avLst/>
+          </a:prstGeom>
+        </p:spPr>
+      </p:pic>
+    </p:spTree>
+    <p:extLst>
+      <p:ext uri="{BB962C8B-B14F-4D97-AF65-F5344CB8AC3E}">
+        <p14:creationId xmlns:p14="http://schemas.microsoft.com/office/powerpoint/2010/main" val="4005996021"/>
       </p:ext>
     </p:extLst>
   </p:cSld>

</xml_diff>